<commit_message>
doubly linked list 로직 간소화
</commit_message>
<xml_diff>
--- a/presentation/list_DoublyLinkedList_java_implementation.pptx
+++ b/presentation/list_DoublyLinkedList_java_implementation.pptx
@@ -111,6 +111,11 @@
       </a:defRPr>
     </a:lvl9pPr>
   </p:defaultTextStyle>
+  <p:extLst>
+    <p:ext uri="{EFAFB233-063F-42B5-8137-9DF3F51BA10A}">
+      <p15:sldGuideLst xmlns:p15="http://schemas.microsoft.com/office/powerpoint/2012/main"/>
+    </p:ext>
+  </p:extLst>
 </p:presentation>
 </file>
 
@@ -424,7 +429,7 @@
           <a:p>
             <a:fld id="{663DF21C-70C8-4271-8B6B-4DC20FA9F572}" type="datetimeFigureOut">
               <a:rPr lang="ko-KR" altLang="en-US" smtClean="0"/>
-              <a:t>2014-12-23</a:t>
+              <a:t>2014-12-26</a:t>
             </a:fld>
             <a:endParaRPr lang="ko-KR" altLang="en-US"/>
           </a:p>
@@ -725,7 +730,7 @@
           <a:p>
             <a:fld id="{663DF21C-70C8-4271-8B6B-4DC20FA9F572}" type="datetimeFigureOut">
               <a:rPr lang="ko-KR" altLang="en-US" smtClean="0"/>
-              <a:t>2014-12-23</a:t>
+              <a:t>2014-12-26</a:t>
             </a:fld>
             <a:endParaRPr lang="ko-KR" altLang="en-US"/>
           </a:p>
@@ -1006,7 +1011,7 @@
           <a:p>
             <a:fld id="{663DF21C-70C8-4271-8B6B-4DC20FA9F572}" type="datetimeFigureOut">
               <a:rPr lang="ko-KR" altLang="en-US" smtClean="0"/>
-              <a:t>2014-12-23</a:t>
+              <a:t>2014-12-26</a:t>
             </a:fld>
             <a:endParaRPr lang="ko-KR" altLang="en-US"/>
           </a:p>
@@ -1200,7 +1205,7 @@
           <a:p>
             <a:fld id="{663DF21C-70C8-4271-8B6B-4DC20FA9F572}" type="datetimeFigureOut">
               <a:rPr lang="ko-KR" altLang="en-US" smtClean="0"/>
-              <a:t>2014-12-23</a:t>
+              <a:t>2014-12-26</a:t>
             </a:fld>
             <a:endParaRPr lang="ko-KR" altLang="en-US"/>
           </a:p>
@@ -1404,7 +1409,7 @@
           <a:p>
             <a:fld id="{663DF21C-70C8-4271-8B6B-4DC20FA9F572}" type="datetimeFigureOut">
               <a:rPr lang="ko-KR" altLang="en-US" smtClean="0"/>
-              <a:t>2014-12-23</a:t>
+              <a:t>2014-12-26</a:t>
             </a:fld>
             <a:endParaRPr lang="ko-KR" altLang="en-US"/>
           </a:p>
@@ -1627,7 +1632,7 @@
           <a:p>
             <a:fld id="{663DF21C-70C8-4271-8B6B-4DC20FA9F572}" type="datetimeFigureOut">
               <a:rPr lang="ko-KR" altLang="en-US" smtClean="0"/>
-              <a:t>2014-12-23</a:t>
+              <a:t>2014-12-26</a:t>
             </a:fld>
             <a:endParaRPr lang="ko-KR" altLang="en-US"/>
           </a:p>
@@ -2138,7 +2143,7 @@
           <a:p>
             <a:fld id="{663DF21C-70C8-4271-8B6B-4DC20FA9F572}" type="datetimeFigureOut">
               <a:rPr lang="ko-KR" altLang="en-US" smtClean="0"/>
-              <a:t>2014-12-23</a:t>
+              <a:t>2014-12-26</a:t>
             </a:fld>
             <a:endParaRPr lang="ko-KR" altLang="en-US"/>
           </a:p>
@@ -2415,7 +2420,7 @@
           <a:p>
             <a:fld id="{663DF21C-70C8-4271-8B6B-4DC20FA9F572}" type="datetimeFigureOut">
               <a:rPr lang="ko-KR" altLang="en-US" smtClean="0"/>
-              <a:t>2014-12-23</a:t>
+              <a:t>2014-12-26</a:t>
             </a:fld>
             <a:endParaRPr lang="ko-KR" altLang="en-US"/>
           </a:p>
@@ -2671,7 +2676,7 @@
           <a:p>
             <a:fld id="{663DF21C-70C8-4271-8B6B-4DC20FA9F572}" type="datetimeFigureOut">
               <a:rPr lang="ko-KR" altLang="en-US" smtClean="0"/>
-              <a:t>2014-12-23</a:t>
+              <a:t>2014-12-26</a:t>
             </a:fld>
             <a:endParaRPr lang="ko-KR" altLang="en-US"/>
           </a:p>
@@ -3062,7 +3067,7 @@
           <a:p>
             <a:fld id="{663DF21C-70C8-4271-8B6B-4DC20FA9F572}" type="datetimeFigureOut">
               <a:rPr lang="ko-KR" altLang="en-US" smtClean="0"/>
-              <a:t>2014-12-23</a:t>
+              <a:t>2014-12-26</a:t>
             </a:fld>
             <a:endParaRPr lang="ko-KR" altLang="en-US"/>
           </a:p>
@@ -3204,7 +3209,7 @@
           <a:p>
             <a:fld id="{663DF21C-70C8-4271-8B6B-4DC20FA9F572}" type="datetimeFigureOut">
               <a:rPr lang="ko-KR" altLang="en-US" smtClean="0"/>
-              <a:t>2014-12-23</a:t>
+              <a:t>2014-12-26</a:t>
             </a:fld>
             <a:endParaRPr lang="ko-KR" altLang="en-US"/>
           </a:p>

</xml_diff>